<commit_message>
apple starfruit strawberry honey peach orange lemon egg
</commit_message>
<xml_diff>
--- a/十大易用性檢討.pptx
+++ b/十大易用性檢討.pptx
@@ -7,6 +7,8 @@
   <p:sldIdLst>
     <p:sldId id="256" r:id="rId2"/>
     <p:sldId id="257" r:id="rId3"/>
+    <p:sldId id="258" r:id="rId4"/>
+    <p:sldId id="259" r:id="rId5"/>
   </p:sldIdLst>
   <p:sldSz cx="12192000" cy="6858000"/>
   <p:notesSz cx="6858000" cy="9144000"/>
@@ -3627,6 +3629,453 @@
 </p:sld>
 </file>
 
+<file path=ppt/slides/slide3.xml><?xml version="1.0" encoding="utf-8"?>
+<p:sld xmlns:a="http://schemas.openxmlformats.org/drawingml/2006/main" xmlns:r="http://schemas.openxmlformats.org/officeDocument/2006/relationships" xmlns:p="http://schemas.openxmlformats.org/presentationml/2006/main">
+  <p:cSld>
+    <p:spTree>
+      <p:nvGrpSpPr>
+        <p:cNvPr id="1" name=""/>
+        <p:cNvGrpSpPr/>
+        <p:nvPr/>
+      </p:nvGrpSpPr>
+      <p:grpSpPr>
+        <a:xfrm>
+          <a:off x="0" y="0"/>
+          <a:ext cx="0" cy="0"/>
+          <a:chOff x="0" y="0"/>
+          <a:chExt cx="0" cy="0"/>
+        </a:xfrm>
+      </p:grpSpPr>
+      <p:sp>
+        <p:nvSpPr>
+          <p:cNvPr id="2" name="標題 1"/>
+          <p:cNvSpPr>
+            <a:spLocks noGrp="1"/>
+          </p:cNvSpPr>
+          <p:nvPr>
+            <p:ph type="title"/>
+          </p:nvPr>
+        </p:nvSpPr>
+        <p:spPr/>
+        <p:txBody>
+          <a:bodyPr/>
+          <a:lstStyle/>
+          <a:p>
+            <a:r>
+              <a:rPr lang="en-US" altLang="zh-TW" dirty="0" smtClean="0"/>
+              <a:t>7.</a:t>
+            </a:r>
+            <a:r>
+              <a:rPr lang="zh-TW" altLang="en-US" dirty="0" smtClean="0"/>
+              <a:t>彈性與使用效率</a:t>
+            </a:r>
+            <a:endParaRPr lang="zh-TW" altLang="en-US" dirty="0"/>
+          </a:p>
+        </p:txBody>
+      </p:sp>
+      <p:pic>
+        <p:nvPicPr>
+          <p:cNvPr id="1026" name="Picture 2"/>
+          <p:cNvPicPr>
+            <a:picLocks noChangeAspect="1" noChangeArrowheads="1"/>
+          </p:cNvPicPr>
+          <p:nvPr/>
+        </p:nvPicPr>
+        <p:blipFill>
+          <a:blip r:embed="rId2">
+            <a:extLst>
+              <a:ext uri="{28A0092B-C50C-407E-A947-70E740481C1C}">
+                <a14:useLocalDpi xmlns:a14="http://schemas.microsoft.com/office/drawing/2010/main" val="0"/>
+              </a:ext>
+            </a:extLst>
+          </a:blip>
+          <a:srcRect/>
+          <a:stretch>
+            <a:fillRect/>
+          </a:stretch>
+        </p:blipFill>
+        <p:spPr bwMode="auto">
+          <a:xfrm>
+            <a:off x="279399" y="2440141"/>
+            <a:ext cx="9194801" cy="4308737"/>
+          </a:xfrm>
+          <a:prstGeom prst="rect">
+            <a:avLst/>
+          </a:prstGeom>
+          <a:noFill/>
+          <a:ln>
+            <a:noFill/>
+          </a:ln>
+          <a:effectLst/>
+          <a:extLst>
+            <a:ext uri="{909E8E84-426E-40DD-AFC4-6F175D3DCCD1}">
+              <a14:hiddenFill xmlns:a14="http://schemas.microsoft.com/office/drawing/2010/main">
+                <a:solidFill>
+                  <a:schemeClr val="accent1"/>
+                </a:solidFill>
+              </a14:hiddenFill>
+            </a:ext>
+            <a:ext uri="{91240B29-F687-4F45-9708-019B960494DF}">
+              <a14:hiddenLine xmlns:a14="http://schemas.microsoft.com/office/drawing/2010/main" w="9525">
+                <a:solidFill>
+                  <a:schemeClr val="tx1"/>
+                </a:solidFill>
+                <a:miter lim="800000"/>
+                <a:headEnd/>
+                <a:tailEnd/>
+              </a14:hiddenLine>
+            </a:ext>
+            <a:ext uri="{AF507438-7753-43E0-B8FC-AC1667EBCBE1}">
+              <a14:hiddenEffects xmlns:a14="http://schemas.microsoft.com/office/drawing/2010/main">
+                <a:effectLst>
+                  <a:outerShdw dist="35921" dir="2700000" algn="ctr" rotWithShape="0">
+                    <a:schemeClr val="bg2"/>
+                  </a:outerShdw>
+                </a:effectLst>
+              </a14:hiddenEffects>
+            </a:ext>
+          </a:extLst>
+        </p:spPr>
+      </p:pic>
+      <p:sp>
+        <p:nvSpPr>
+          <p:cNvPr id="4" name="文字方塊 3"/>
+          <p:cNvSpPr txBox="1"/>
+          <p:nvPr/>
+        </p:nvSpPr>
+        <p:spPr>
+          <a:xfrm>
+            <a:off x="3860800" y="1721366"/>
+            <a:ext cx="2527300" cy="369332"/>
+          </a:xfrm>
+          <a:prstGeom prst="rect">
+            <a:avLst/>
+          </a:prstGeom>
+          <a:noFill/>
+        </p:spPr>
+        <p:txBody>
+          <a:bodyPr wrap="square" rtlCol="0">
+            <a:spAutoFit/>
+          </a:bodyPr>
+          <a:lstStyle/>
+          <a:p>
+            <a:r>
+              <a:rPr lang="zh-TW" altLang="en-US" dirty="0" smtClean="0"/>
+              <a:t>問題：頁面太長</a:t>
+            </a:r>
+            <a:endParaRPr lang="zh-TW" altLang="en-US" dirty="0"/>
+          </a:p>
+        </p:txBody>
+      </p:sp>
+      <p:cxnSp>
+        <p:nvCxnSpPr>
+          <p:cNvPr id="8" name="直線單箭頭接點 7"/>
+          <p:cNvCxnSpPr/>
+          <p:nvPr/>
+        </p:nvCxnSpPr>
+        <p:spPr>
+          <a:xfrm>
+            <a:off x="5124450" y="2209800"/>
+            <a:ext cx="4102099" cy="2200044"/>
+          </a:xfrm>
+          <a:prstGeom prst="straightConnector1">
+            <a:avLst/>
+          </a:prstGeom>
+          <a:ln>
+            <a:tailEnd type="arrow"/>
+          </a:ln>
+        </p:spPr>
+        <p:style>
+          <a:lnRef idx="1">
+            <a:schemeClr val="dk1"/>
+          </a:lnRef>
+          <a:fillRef idx="0">
+            <a:schemeClr val="dk1"/>
+          </a:fillRef>
+          <a:effectRef idx="0">
+            <a:schemeClr val="dk1"/>
+          </a:effectRef>
+          <a:fontRef idx="minor">
+            <a:schemeClr val="tx1"/>
+          </a:fontRef>
+        </p:style>
+      </p:cxnSp>
+      <p:sp>
+        <p:nvSpPr>
+          <p:cNvPr id="11" name="文字方塊 10"/>
+          <p:cNvSpPr txBox="1"/>
+          <p:nvPr/>
+        </p:nvSpPr>
+        <p:spPr>
+          <a:xfrm>
+            <a:off x="7607300" y="1721366"/>
+            <a:ext cx="3543300" cy="369332"/>
+          </a:xfrm>
+          <a:prstGeom prst="rect">
+            <a:avLst/>
+          </a:prstGeom>
+          <a:noFill/>
+        </p:spPr>
+        <p:txBody>
+          <a:bodyPr wrap="square" rtlCol="0">
+            <a:spAutoFit/>
+          </a:bodyPr>
+          <a:lstStyle/>
+          <a:p>
+            <a:r>
+              <a:rPr lang="zh-TW" altLang="en-US" dirty="0"/>
+              <a:t>解決辦法</a:t>
+            </a:r>
+            <a:r>
+              <a:rPr lang="zh-TW" altLang="en-US" dirty="0" smtClean="0"/>
+              <a:t>：加個按鈕 回到頂層</a:t>
+            </a:r>
+            <a:endParaRPr lang="zh-TW" altLang="en-US" dirty="0"/>
+          </a:p>
+        </p:txBody>
+      </p:sp>
+    </p:spTree>
+    <p:extLst>
+      <p:ext uri="{BB962C8B-B14F-4D97-AF65-F5344CB8AC3E}">
+        <p14:creationId xmlns:p14="http://schemas.microsoft.com/office/powerpoint/2010/main" val="2278591263"/>
+      </p:ext>
+    </p:extLst>
+  </p:cSld>
+  <p:clrMapOvr>
+    <a:masterClrMapping/>
+  </p:clrMapOvr>
+</p:sld>
+</file>
+
+<file path=ppt/slides/slide4.xml><?xml version="1.0" encoding="utf-8"?>
+<p:sld xmlns:a="http://schemas.openxmlformats.org/drawingml/2006/main" xmlns:r="http://schemas.openxmlformats.org/officeDocument/2006/relationships" xmlns:p="http://schemas.openxmlformats.org/presentationml/2006/main">
+  <p:cSld>
+    <p:spTree>
+      <p:nvGrpSpPr>
+        <p:cNvPr id="1" name=""/>
+        <p:cNvGrpSpPr/>
+        <p:nvPr/>
+      </p:nvGrpSpPr>
+      <p:grpSpPr>
+        <a:xfrm>
+          <a:off x="0" y="0"/>
+          <a:ext cx="0" cy="0"/>
+          <a:chOff x="0" y="0"/>
+          <a:chExt cx="0" cy="0"/>
+        </a:xfrm>
+      </p:grpSpPr>
+      <p:sp>
+        <p:nvSpPr>
+          <p:cNvPr id="2" name="標題 1"/>
+          <p:cNvSpPr>
+            <a:spLocks noGrp="1"/>
+          </p:cNvSpPr>
+          <p:nvPr>
+            <p:ph type="title"/>
+          </p:nvPr>
+        </p:nvSpPr>
+        <p:spPr/>
+        <p:txBody>
+          <a:bodyPr/>
+          <a:lstStyle/>
+          <a:p>
+            <a:r>
+              <a:rPr lang="en-US" altLang="zh-TW" dirty="0"/>
+              <a:t>6</a:t>
+            </a:r>
+            <a:r>
+              <a:rPr lang="en-US" altLang="zh-TW" dirty="0" smtClean="0"/>
+              <a:t>.</a:t>
+            </a:r>
+            <a:r>
+              <a:rPr lang="zh-TW" altLang="en-US" dirty="0"/>
+              <a:t>辨識而非記憶</a:t>
+            </a:r>
+          </a:p>
+        </p:txBody>
+      </p:sp>
+      <p:pic>
+        <p:nvPicPr>
+          <p:cNvPr id="2050" name="Picture 2"/>
+          <p:cNvPicPr>
+            <a:picLocks noChangeAspect="1" noChangeArrowheads="1"/>
+          </p:cNvPicPr>
+          <p:nvPr/>
+        </p:nvPicPr>
+        <p:blipFill>
+          <a:blip r:embed="rId2">
+            <a:extLst>
+              <a:ext uri="{28A0092B-C50C-407E-A947-70E740481C1C}">
+                <a14:useLocalDpi xmlns:a14="http://schemas.microsoft.com/office/drawing/2010/main" val="0"/>
+              </a:ext>
+            </a:extLst>
+          </a:blip>
+          <a:srcRect/>
+          <a:stretch>
+            <a:fillRect/>
+          </a:stretch>
+        </p:blipFill>
+        <p:spPr bwMode="auto">
+          <a:xfrm>
+            <a:off x="1524000" y="2032057"/>
+            <a:ext cx="9764713" cy="4560830"/>
+          </a:xfrm>
+          <a:prstGeom prst="rect">
+            <a:avLst/>
+          </a:prstGeom>
+          <a:noFill/>
+          <a:ln>
+            <a:noFill/>
+          </a:ln>
+          <a:effectLst/>
+          <a:extLst>
+            <a:ext uri="{909E8E84-426E-40DD-AFC4-6F175D3DCCD1}">
+              <a14:hiddenFill xmlns:a14="http://schemas.microsoft.com/office/drawing/2010/main">
+                <a:solidFill>
+                  <a:schemeClr val="accent1"/>
+                </a:solidFill>
+              </a14:hiddenFill>
+            </a:ext>
+            <a:ext uri="{91240B29-F687-4F45-9708-019B960494DF}">
+              <a14:hiddenLine xmlns:a14="http://schemas.microsoft.com/office/drawing/2010/main" w="9525">
+                <a:solidFill>
+                  <a:schemeClr val="tx1"/>
+                </a:solidFill>
+                <a:miter lim="800000"/>
+                <a:headEnd/>
+                <a:tailEnd/>
+              </a14:hiddenLine>
+            </a:ext>
+            <a:ext uri="{AF507438-7753-43E0-B8FC-AC1667EBCBE1}">
+              <a14:hiddenEffects xmlns:a14="http://schemas.microsoft.com/office/drawing/2010/main">
+                <a:effectLst>
+                  <a:outerShdw dist="35921" dir="2700000" algn="ctr" rotWithShape="0">
+                    <a:schemeClr val="bg2"/>
+                  </a:outerShdw>
+                </a:effectLst>
+              </a14:hiddenEffects>
+            </a:ext>
+          </a:extLst>
+        </p:spPr>
+      </p:pic>
+      <p:sp>
+        <p:nvSpPr>
+          <p:cNvPr id="5" name="文字方塊 4"/>
+          <p:cNvSpPr txBox="1"/>
+          <p:nvPr/>
+        </p:nvSpPr>
+        <p:spPr>
+          <a:xfrm>
+            <a:off x="266700" y="1536700"/>
+            <a:ext cx="3797300" cy="369332"/>
+          </a:xfrm>
+          <a:prstGeom prst="rect">
+            <a:avLst/>
+          </a:prstGeom>
+          <a:noFill/>
+        </p:spPr>
+        <p:txBody>
+          <a:bodyPr wrap="square" rtlCol="0">
+            <a:spAutoFit/>
+          </a:bodyPr>
+          <a:lstStyle/>
+          <a:p>
+            <a:r>
+              <a:rPr lang="zh-TW" altLang="en-US" dirty="0"/>
+              <a:t>問題</a:t>
+            </a:r>
+            <a:r>
+              <a:rPr lang="zh-TW" altLang="en-US" dirty="0" smtClean="0"/>
+              <a:t>：無法得知目前頁面位置</a:t>
+            </a:r>
+            <a:endParaRPr lang="zh-TW" altLang="en-US" dirty="0"/>
+          </a:p>
+        </p:txBody>
+      </p:sp>
+      <p:cxnSp>
+        <p:nvCxnSpPr>
+          <p:cNvPr id="6" name="直線單箭頭接點 5"/>
+          <p:cNvCxnSpPr/>
+          <p:nvPr/>
+        </p:nvCxnSpPr>
+        <p:spPr>
+          <a:xfrm>
+            <a:off x="3524250" y="1721366"/>
+            <a:ext cx="2419350" cy="310691"/>
+          </a:xfrm>
+          <a:prstGeom prst="straightConnector1">
+            <a:avLst/>
+          </a:prstGeom>
+          <a:ln>
+            <a:tailEnd type="arrow"/>
+          </a:ln>
+        </p:spPr>
+        <p:style>
+          <a:lnRef idx="1">
+            <a:schemeClr val="dk1"/>
+          </a:lnRef>
+          <a:fillRef idx="0">
+            <a:schemeClr val="dk1"/>
+          </a:fillRef>
+          <a:effectRef idx="0">
+            <a:schemeClr val="dk1"/>
+          </a:effectRef>
+          <a:fontRef idx="minor">
+            <a:schemeClr val="tx1"/>
+          </a:fontRef>
+        </p:style>
+      </p:cxnSp>
+      <p:sp>
+        <p:nvSpPr>
+          <p:cNvPr id="7" name="文字方塊 6"/>
+          <p:cNvSpPr txBox="1"/>
+          <p:nvPr/>
+        </p:nvSpPr>
+        <p:spPr>
+          <a:xfrm>
+            <a:off x="7010400" y="1358900"/>
+            <a:ext cx="3543300" cy="646331"/>
+          </a:xfrm>
+          <a:prstGeom prst="rect">
+            <a:avLst/>
+          </a:prstGeom>
+          <a:noFill/>
+        </p:spPr>
+        <p:txBody>
+          <a:bodyPr wrap="square" rtlCol="0">
+            <a:spAutoFit/>
+          </a:bodyPr>
+          <a:lstStyle/>
+          <a:p>
+            <a:r>
+              <a:rPr lang="zh-TW" altLang="en-US" dirty="0"/>
+              <a:t>解決</a:t>
+            </a:r>
+            <a:r>
+              <a:rPr lang="zh-TW" altLang="en-US"/>
+              <a:t>辦法</a:t>
+            </a:r>
+            <a:r>
+              <a:rPr lang="zh-TW" altLang="en-US" smtClean="0"/>
+              <a:t>：加個麵包屑 讓使用者知道目前頁面是在哪邊</a:t>
+            </a:r>
+            <a:endParaRPr lang="zh-TW" altLang="en-US" dirty="0"/>
+          </a:p>
+        </p:txBody>
+      </p:sp>
+    </p:spTree>
+    <p:extLst>
+      <p:ext uri="{BB962C8B-B14F-4D97-AF65-F5344CB8AC3E}">
+        <p14:creationId xmlns:p14="http://schemas.microsoft.com/office/powerpoint/2010/main" val="2120126825"/>
+      </p:ext>
+    </p:extLst>
+  </p:cSld>
+  <p:clrMapOvr>
+    <a:masterClrMapping/>
+  </p:clrMapOvr>
+</p:sld>
+</file>
+
 <file path=ppt/theme/theme1.xml><?xml version="1.0" encoding="utf-8"?>
 <a:theme xmlns:a="http://schemas.openxmlformats.org/drawingml/2006/main" name="Office 佈景主題">
   <a:themeElements>
@@ -3670,7 +4119,7 @@
     </a:clrScheme>
     <a:fontScheme name="Office">
       <a:majorFont>
-        <a:latin typeface="Calibri Light" panose="020F0302020204030204"/>
+        <a:latin typeface="Calibri Light"/>
         <a:ea typeface=""/>
         <a:cs typeface=""/>
         <a:font script="Jpan" typeface="游ゴシック Light"/>
@@ -3705,7 +4154,7 @@
         <a:font script="Geor" typeface="Sylfaen"/>
       </a:majorFont>
       <a:minorFont>
-        <a:latin typeface="Calibri" panose="020F0502020204030204"/>
+        <a:latin typeface="Calibri"/>
         <a:ea typeface=""/>
         <a:cs typeface=""/>
         <a:font script="Jpan" typeface="游ゴシック"/>
@@ -3882,7 +4331,7 @@
   <a:extraClrSchemeLst/>
   <a:extLst>
     <a:ext uri="{05A4C25C-085E-4340-85A3-A5531E510DB2}">
-      <thm15:themeFamily xmlns:thm15="http://schemas.microsoft.com/office/thememl/2012/main" name="Office Theme" id="{62F939B6-93AF-4DB8-9C6B-D6C7DFDC589F}" vid="{4A3C46E8-61CC-4603-A589-7422A47A8E4A}"/>
+      <thm15:themeFamily xmlns:thm15="http://schemas.microsoft.com/office/thememl/2012/main" xmlns="" name="Office Theme" id="{62F939B6-93AF-4DB8-9C6B-D6C7DFDC589F}" vid="{4A3C46E8-61CC-4603-A589-7422A47A8E4A}"/>
     </a:ext>
   </a:extLst>
 </a:theme>

</xml_diff>